<commit_message>
revised scoring for social isolation/loneliness to conform with De Jong Gierveld Lonliness Scale
</commit_message>
<xml_diff>
--- a/scripts/report/graphics.pptx
+++ b/scripts/report/graphics.pptx
@@ -104,7 +104,64 @@
       </a:defRPr>
     </a:lvl9pPr>
   </p:defaultTextStyle>
+  <p:extLst>
+    <p:ext uri="{EFAFB233-063F-42B5-8137-9DF3F51BA10A}">
+      <p15:sldGuideLst xmlns:p15="http://schemas.microsoft.com/office/powerpoint/2012/main"/>
+    </p:ext>
+  </p:extLst>
 </p:presentation>
+</file>
+
+<file path=ppt/changesInfos/changesInfo1.xml><?xml version="1.0" encoding="utf-8"?>
+<pc:chgInfo xmlns:a="http://schemas.openxmlformats.org/drawingml/2006/main" xmlns:r="http://schemas.openxmlformats.org/officeDocument/2006/relationships" xmlns:ac="http://schemas.microsoft.com/office/drawing/2013/main/command" xmlns:pc="http://schemas.microsoft.com/office/powerpoint/2013/main/command">
+  <pc:docChgLst>
+    <pc:chgData name="Monaco, Eliot" userId="fe327d88-ea5f-458a-a333-aed2b826bf10" providerId="ADAL" clId="{84F148D7-33C4-4C04-B8F8-581293ADFAE2}"/>
+    <pc:docChg chg="undo redo custSel addSld delSld modSld">
+      <pc:chgData name="Monaco, Eliot" userId="fe327d88-ea5f-458a-a333-aed2b826bf10" providerId="ADAL" clId="{84F148D7-33C4-4C04-B8F8-581293ADFAE2}" dt="2025-09-15T20:00:57.598" v="127" actId="207"/>
+      <pc:docMkLst>
+        <pc:docMk/>
+      </pc:docMkLst>
+      <pc:sldChg chg="addSp delSp modSp mod">
+        <pc:chgData name="Monaco, Eliot" userId="fe327d88-ea5f-458a-a333-aed2b826bf10" providerId="ADAL" clId="{84F148D7-33C4-4C04-B8F8-581293ADFAE2}" dt="2025-09-15T20:00:57.598" v="127" actId="207"/>
+        <pc:sldMkLst>
+          <pc:docMk/>
+          <pc:sldMk cId="2941509547" sldId="257"/>
+        </pc:sldMkLst>
+        <pc:picChg chg="add mod modCrop">
+          <ac:chgData name="Monaco, Eliot" userId="fe327d88-ea5f-458a-a333-aed2b826bf10" providerId="ADAL" clId="{84F148D7-33C4-4C04-B8F8-581293ADFAE2}" dt="2025-09-15T20:00:57.598" v="127" actId="207"/>
+          <ac:picMkLst>
+            <pc:docMk/>
+            <pc:sldMk cId="2941509547" sldId="257"/>
+            <ac:picMk id="3" creationId="{0FC7614A-F30A-E755-33E6-376C35FE3B41}"/>
+          </ac:picMkLst>
+        </pc:picChg>
+        <pc:picChg chg="add del mod modCrop">
+          <ac:chgData name="Monaco, Eliot" userId="fe327d88-ea5f-458a-a333-aed2b826bf10" providerId="ADAL" clId="{84F148D7-33C4-4C04-B8F8-581293ADFAE2}" dt="2025-09-15T19:59:58.344" v="120" actId="478"/>
+          <ac:picMkLst>
+            <pc:docMk/>
+            <pc:sldMk cId="2941509547" sldId="257"/>
+            <ac:picMk id="5" creationId="{3CAD23C9-9DB9-71AD-7DE5-4E64C8158185}"/>
+          </ac:picMkLst>
+        </pc:picChg>
+      </pc:sldChg>
+      <pc:sldChg chg="addSp modSp new add del mod">
+        <pc:chgData name="Monaco, Eliot" userId="fe327d88-ea5f-458a-a333-aed2b826bf10" providerId="ADAL" clId="{84F148D7-33C4-4C04-B8F8-581293ADFAE2}" dt="2025-09-15T19:55:30.778" v="44" actId="680"/>
+        <pc:sldMkLst>
+          <pc:docMk/>
+          <pc:sldMk cId="816419118" sldId="258"/>
+        </pc:sldMkLst>
+        <pc:picChg chg="add mod">
+          <ac:chgData name="Monaco, Eliot" userId="fe327d88-ea5f-458a-a333-aed2b826bf10" providerId="ADAL" clId="{84F148D7-33C4-4C04-B8F8-581293ADFAE2}" dt="2025-09-15T19:55:30.419" v="43" actId="931"/>
+          <ac:picMkLst>
+            <pc:docMk/>
+            <pc:sldMk cId="816419118" sldId="258"/>
+            <ac:picMk id="3" creationId="{535B4D8B-4359-6A48-2FC9-AA3FE83C29D3}"/>
+          </ac:picMkLst>
+        </pc:picChg>
+      </pc:sldChg>
+    </pc:docChg>
+  </pc:docChgLst>
+</pc:chgInfo>
 </file>
 
 <file path=ppt/slideLayouts/slideLayout1.xml><?xml version="1.0" encoding="utf-8"?>
@@ -254,7 +311,7 @@
           <a:p>
             <a:fld id="{06FD3680-A8DA-475B-8C5D-89BA416F5326}" type="datetimeFigureOut">
               <a:rPr lang="en-US" smtClean="0"/>
-              <a:t>9/14/2025</a:t>
+              <a:t>9/15/2025</a:t>
             </a:fld>
             <a:endParaRPr lang="en-US"/>
           </a:p>
@@ -452,7 +509,7 @@
           <a:p>
             <a:fld id="{06FD3680-A8DA-475B-8C5D-89BA416F5326}" type="datetimeFigureOut">
               <a:rPr lang="en-US" smtClean="0"/>
-              <a:t>9/14/2025</a:t>
+              <a:t>9/15/2025</a:t>
             </a:fld>
             <a:endParaRPr lang="en-US"/>
           </a:p>
@@ -660,7 +717,7 @@
           <a:p>
             <a:fld id="{06FD3680-A8DA-475B-8C5D-89BA416F5326}" type="datetimeFigureOut">
               <a:rPr lang="en-US" smtClean="0"/>
-              <a:t>9/14/2025</a:t>
+              <a:t>9/15/2025</a:t>
             </a:fld>
             <a:endParaRPr lang="en-US"/>
           </a:p>
@@ -858,7 +915,7 @@
           <a:p>
             <a:fld id="{06FD3680-A8DA-475B-8C5D-89BA416F5326}" type="datetimeFigureOut">
               <a:rPr lang="en-US" smtClean="0"/>
-              <a:t>9/14/2025</a:t>
+              <a:t>9/15/2025</a:t>
             </a:fld>
             <a:endParaRPr lang="en-US"/>
           </a:p>
@@ -1133,7 +1190,7 @@
           <a:p>
             <a:fld id="{06FD3680-A8DA-475B-8C5D-89BA416F5326}" type="datetimeFigureOut">
               <a:rPr lang="en-US" smtClean="0"/>
-              <a:t>9/14/2025</a:t>
+              <a:t>9/15/2025</a:t>
             </a:fld>
             <a:endParaRPr lang="en-US"/>
           </a:p>
@@ -1398,7 +1455,7 @@
           <a:p>
             <a:fld id="{06FD3680-A8DA-475B-8C5D-89BA416F5326}" type="datetimeFigureOut">
               <a:rPr lang="en-US" smtClean="0"/>
-              <a:t>9/14/2025</a:t>
+              <a:t>9/15/2025</a:t>
             </a:fld>
             <a:endParaRPr lang="en-US"/>
           </a:p>
@@ -1810,7 +1867,7 @@
           <a:p>
             <a:fld id="{06FD3680-A8DA-475B-8C5D-89BA416F5326}" type="datetimeFigureOut">
               <a:rPr lang="en-US" smtClean="0"/>
-              <a:t>9/14/2025</a:t>
+              <a:t>9/15/2025</a:t>
             </a:fld>
             <a:endParaRPr lang="en-US"/>
           </a:p>
@@ -1951,7 +2008,7 @@
           <a:p>
             <a:fld id="{06FD3680-A8DA-475B-8C5D-89BA416F5326}" type="datetimeFigureOut">
               <a:rPr lang="en-US" smtClean="0"/>
-              <a:t>9/14/2025</a:t>
+              <a:t>9/15/2025</a:t>
             </a:fld>
             <a:endParaRPr lang="en-US"/>
           </a:p>
@@ -2064,7 +2121,7 @@
           <a:p>
             <a:fld id="{06FD3680-A8DA-475B-8C5D-89BA416F5326}" type="datetimeFigureOut">
               <a:rPr lang="en-US" smtClean="0"/>
-              <a:t>9/14/2025</a:t>
+              <a:t>9/15/2025</a:t>
             </a:fld>
             <a:endParaRPr lang="en-US"/>
           </a:p>
@@ -2375,7 +2432,7 @@
           <a:p>
             <a:fld id="{06FD3680-A8DA-475B-8C5D-89BA416F5326}" type="datetimeFigureOut">
               <a:rPr lang="en-US" smtClean="0"/>
-              <a:t>9/14/2025</a:t>
+              <a:t>9/15/2025</a:t>
             </a:fld>
             <a:endParaRPr lang="en-US"/>
           </a:p>
@@ -2663,7 +2720,7 @@
           <a:p>
             <a:fld id="{06FD3680-A8DA-475B-8C5D-89BA416F5326}" type="datetimeFigureOut">
               <a:rPr lang="en-US" smtClean="0"/>
-              <a:t>9/14/2025</a:t>
+              <a:t>9/15/2025</a:t>
             </a:fld>
             <a:endParaRPr lang="en-US"/>
           </a:p>
@@ -2904,7 +2961,7 @@
           <a:p>
             <a:fld id="{06FD3680-A8DA-475B-8C5D-89BA416F5326}" type="datetimeFigureOut">
               <a:rPr lang="en-US" smtClean="0"/>
-              <a:t>9/14/2025</a:t>
+              <a:t>9/15/2025</a:t>
             </a:fld>
             <a:endParaRPr lang="en-US"/>
           </a:p>
@@ -3337,10 +3394,10 @@
       </p:grpSpPr>
       <p:pic>
         <p:nvPicPr>
-          <p:cNvPr id="5" name="Graphic 4">
-            <a:extLst>
-              <a:ext uri="{FF2B5EF4-FFF2-40B4-BE49-F238E27FC236}">
-                <a16:creationId xmlns:a16="http://schemas.microsoft.com/office/drawing/2014/main" id="{3CAD23C9-9DB9-71AD-7DE5-4E64C8158185}"/>
+          <p:cNvPr id="3" name="Graphic 2">
+            <a:extLst>
+              <a:ext uri="{FF2B5EF4-FFF2-40B4-BE49-F238E27FC236}">
+                <a16:creationId xmlns:a16="http://schemas.microsoft.com/office/drawing/2014/main" id="{0FC7614A-F30A-E755-33E6-376C35FE3B41}"/>
               </a:ext>
             </a:extLst>
           </p:cNvPr>
@@ -3357,15 +3414,15 @@
               </a:ext>
             </a:extLst>
           </a:blip>
-          <a:srcRect t="-4" b="78325"/>
+          <a:srcRect b="81420"/>
           <a:stretch>
             <a:fillRect/>
           </a:stretch>
         </p:blipFill>
         <p:spPr>
           <a:xfrm>
-            <a:off x="4972050" y="1952625"/>
-            <a:ext cx="2247900" cy="640080"/>
+            <a:off x="4793415" y="2427021"/>
+            <a:ext cx="2247900" cy="548640"/>
           </a:xfrm>
           <a:prstGeom prst="rect">
             <a:avLst/>

</xml_diff>